<commit_message>
Add Maria's audio to the presentation
</commit_message>
<xml_diff>
--- a/Documents/Documentation & Presentation/Presentation.pptx
+++ b/Documents/Documentation & Presentation/Presentation.pptx
@@ -45,14 +45,14 @@
       <p:bold r:id="rId22"/>
     </p:embeddedFont>
     <p:embeddedFont>
-      <p:font typeface="Titillium Web" panose="00000500000000000000" pitchFamily="2" charset="0"/>
+      <p:font typeface="Titillium Web" panose="020B0604020202020204" charset="0"/>
       <p:regular r:id="rId23"/>
       <p:bold r:id="rId24"/>
       <p:italic r:id="rId25"/>
       <p:boldItalic r:id="rId26"/>
     </p:embeddedFont>
     <p:embeddedFont>
-      <p:font typeface="Titillium Web SemiBold" panose="00000700000000000000" pitchFamily="2" charset="0"/>
+      <p:font typeface="Titillium Web SemiBold" panose="020B0604020202020204" charset="0"/>
       <p:regular r:id="rId27"/>
       <p:bold r:id="rId28"/>
       <p:italic r:id="rId29"/>
@@ -2218,14 +2218,14 @@
   <p:clrMapOvr>
     <a:masterClrMapping/>
   </p:clrMapOvr>
-  <mc:AlternateContent xmlns:mc="http://schemas.openxmlformats.org/markup-compatibility/2006" xmlns:p14="http://schemas.microsoft.com/office/powerpoint/2010/main">
-    <mc:Choice Requires="p14">
-      <p:transition spd="slow" p14:dur="1750">
+  <mc:AlternateContent xmlns:mc="http://schemas.openxmlformats.org/markup-compatibility/2006">
+    <mc:Choice xmlns:p14="http://schemas.microsoft.com/office/powerpoint/2010/main" Requires="p14">
+      <p:transition spd="slow" p14:dur="1750" advTm="3000">
         <p14:ferris dir="l"/>
       </p:transition>
     </mc:Choice>
-    <mc:Fallback xmlns="">
-      <p:transition spd="slow">
+    <mc:Fallback>
+      <p:transition spd="slow" advTm="3000">
         <p:fade/>
       </p:transition>
     </mc:Fallback>
@@ -3462,14 +3462,14 @@
   <p:clrMapOvr>
     <a:masterClrMapping/>
   </p:clrMapOvr>
-  <mc:AlternateContent xmlns:mc="http://schemas.openxmlformats.org/markup-compatibility/2006" xmlns:p14="http://schemas.microsoft.com/office/powerpoint/2010/main">
-    <mc:Choice Requires="p14">
-      <p:transition spd="slow" p14:dur="1750">
+  <mc:AlternateContent xmlns:mc="http://schemas.openxmlformats.org/markup-compatibility/2006">
+    <mc:Choice xmlns:p14="http://schemas.microsoft.com/office/powerpoint/2010/main" Requires="p14">
+      <p:transition spd="slow" p14:dur="1750" advTm="3000">
         <p14:ferris dir="l"/>
       </p:transition>
     </mc:Choice>
-    <mc:Fallback xmlns="">
-      <p:transition spd="slow">
+    <mc:Fallback>
+      <p:transition spd="slow" advTm="3000">
         <p:fade/>
       </p:transition>
     </mc:Fallback>
@@ -3932,14 +3932,14 @@
   <p:clrMapOvr>
     <a:masterClrMapping/>
   </p:clrMapOvr>
-  <mc:AlternateContent xmlns:mc="http://schemas.openxmlformats.org/markup-compatibility/2006" xmlns:p14="http://schemas.microsoft.com/office/powerpoint/2010/main">
-    <mc:Choice Requires="p14">
-      <p:transition spd="slow" p14:dur="1750">
+  <mc:AlternateContent xmlns:mc="http://schemas.openxmlformats.org/markup-compatibility/2006">
+    <mc:Choice xmlns:p14="http://schemas.microsoft.com/office/powerpoint/2010/main" Requires="p14">
+      <p:transition spd="slow" p14:dur="1750" advTm="3000">
         <p14:ferris dir="l"/>
       </p:transition>
     </mc:Choice>
-    <mc:Fallback xmlns="">
-      <p:transition spd="slow">
+    <mc:Fallback>
+      <p:transition spd="slow" advTm="3000">
         <p:fade/>
       </p:transition>
     </mc:Fallback>
@@ -5821,14 +5821,14 @@
   <p:clrMapOvr>
     <a:masterClrMapping/>
   </p:clrMapOvr>
-  <mc:AlternateContent xmlns:mc="http://schemas.openxmlformats.org/markup-compatibility/2006" xmlns:p14="http://schemas.microsoft.com/office/powerpoint/2010/main">
-    <mc:Choice Requires="p14">
-      <p:transition spd="slow" p14:dur="1750">
+  <mc:AlternateContent xmlns:mc="http://schemas.openxmlformats.org/markup-compatibility/2006">
+    <mc:Choice xmlns:p14="http://schemas.microsoft.com/office/powerpoint/2010/main" Requires="p14">
+      <p:transition spd="slow" p14:dur="1750" advTm="3000">
         <p14:ferris dir="l"/>
       </p:transition>
     </mc:Choice>
-    <mc:Fallback xmlns="">
-      <p:transition spd="slow">
+    <mc:Fallback>
+      <p:transition spd="slow" advTm="3000">
         <p:fade/>
       </p:transition>
     </mc:Fallback>
@@ -6549,14 +6549,14 @@
   <p:clrMapOvr>
     <a:masterClrMapping/>
   </p:clrMapOvr>
-  <mc:AlternateContent xmlns:mc="http://schemas.openxmlformats.org/markup-compatibility/2006" xmlns:p14="http://schemas.microsoft.com/office/powerpoint/2010/main">
-    <mc:Choice Requires="p14">
-      <p:transition spd="slow" p14:dur="1750">
+  <mc:AlternateContent xmlns:mc="http://schemas.openxmlformats.org/markup-compatibility/2006">
+    <mc:Choice xmlns:p14="http://schemas.microsoft.com/office/powerpoint/2010/main" Requires="p14">
+      <p:transition spd="slow" p14:dur="1750" advTm="3000">
         <p14:ferris dir="l"/>
       </p:transition>
     </mc:Choice>
-    <mc:Fallback xmlns="">
-      <p:transition spd="slow">
+    <mc:Fallback>
+      <p:transition spd="slow" advTm="3000">
         <p:fade/>
       </p:transition>
     </mc:Fallback>
@@ -7019,14 +7019,14 @@
   <p:clrMapOvr>
     <a:masterClrMapping/>
   </p:clrMapOvr>
-  <mc:AlternateContent xmlns:mc="http://schemas.openxmlformats.org/markup-compatibility/2006" xmlns:p14="http://schemas.microsoft.com/office/powerpoint/2010/main">
-    <mc:Choice Requires="p14">
-      <p:transition spd="slow" p14:dur="1750">
+  <mc:AlternateContent xmlns:mc="http://schemas.openxmlformats.org/markup-compatibility/2006">
+    <mc:Choice xmlns:p14="http://schemas.microsoft.com/office/powerpoint/2010/main" Requires="p14">
+      <p:transition spd="slow" p14:dur="1750" advTm="3000">
         <p14:ferris dir="l"/>
       </p:transition>
     </mc:Choice>
-    <mc:Fallback xmlns="">
-      <p:transition spd="slow">
+    <mc:Fallback>
+      <p:transition spd="slow" advTm="3000">
         <p:fade/>
       </p:transition>
     </mc:Fallback>
@@ -7185,14 +7185,14 @@
   <p:clrMapOvr>
     <a:masterClrMapping/>
   </p:clrMapOvr>
-  <mc:AlternateContent xmlns:mc="http://schemas.openxmlformats.org/markup-compatibility/2006" xmlns:p14="http://schemas.microsoft.com/office/powerpoint/2010/main">
-    <mc:Choice Requires="p14">
-      <p:transition spd="slow" p14:dur="1750">
+  <mc:AlternateContent xmlns:mc="http://schemas.openxmlformats.org/markup-compatibility/2006">
+    <mc:Choice xmlns:p14="http://schemas.microsoft.com/office/powerpoint/2010/main" Requires="p14">
+      <p:transition spd="slow" p14:dur="1750" advTm="3000">
         <p14:ferris dir="l"/>
       </p:transition>
     </mc:Choice>
-    <mc:Fallback xmlns="">
-      <p:transition spd="slow">
+    <mc:Fallback>
+      <p:transition spd="slow" advTm="3000">
         <p:fade/>
       </p:transition>
     </mc:Fallback>
@@ -7636,14 +7636,14 @@
   <p:clrMapOvr>
     <a:masterClrMapping/>
   </p:clrMapOvr>
-  <mc:AlternateContent xmlns:mc="http://schemas.openxmlformats.org/markup-compatibility/2006" xmlns:p14="http://schemas.microsoft.com/office/powerpoint/2010/main">
-    <mc:Choice Requires="p14">
-      <p:transition spd="slow" p14:dur="1750">
+  <mc:AlternateContent xmlns:mc="http://schemas.openxmlformats.org/markup-compatibility/2006">
+    <mc:Choice xmlns:p14="http://schemas.microsoft.com/office/powerpoint/2010/main" Requires="p14">
+      <p:transition spd="slow" p14:dur="1750" advTm="3000">
         <p14:ferris dir="l"/>
       </p:transition>
     </mc:Choice>
-    <mc:Fallback xmlns="">
-      <p:transition spd="slow">
+    <mc:Fallback>
+      <p:transition spd="slow" advTm="3000">
         <p:fade/>
       </p:transition>
     </mc:Fallback>
@@ -7717,14 +7717,14 @@
   <p:clrMapOvr>
     <a:masterClrMapping/>
   </p:clrMapOvr>
-  <mc:AlternateContent xmlns:mc="http://schemas.openxmlformats.org/markup-compatibility/2006" xmlns:p14="http://schemas.microsoft.com/office/powerpoint/2010/main">
-    <mc:Choice Requires="p14">
-      <p:transition spd="slow" p14:dur="1750">
+  <mc:AlternateContent xmlns:mc="http://schemas.openxmlformats.org/markup-compatibility/2006">
+    <mc:Choice xmlns:p14="http://schemas.microsoft.com/office/powerpoint/2010/main" Requires="p14">
+      <p:transition spd="slow" p14:dur="1750" advTm="3000">
         <p14:ferris dir="l"/>
       </p:transition>
     </mc:Choice>
-    <mc:Fallback xmlns="">
-      <p:transition spd="slow">
+    <mc:Fallback>
+      <p:transition spd="slow" advTm="3000">
         <p:fade/>
       </p:transition>
     </mc:Fallback>
@@ -7754,14 +7754,14 @@
   <p:clrMapOvr>
     <a:masterClrMapping/>
   </p:clrMapOvr>
-  <mc:AlternateContent xmlns:mc="http://schemas.openxmlformats.org/markup-compatibility/2006" xmlns:p14="http://schemas.microsoft.com/office/powerpoint/2010/main">
-    <mc:Choice Requires="p14">
-      <p:transition spd="slow" p14:dur="1750">
+  <mc:AlternateContent xmlns:mc="http://schemas.openxmlformats.org/markup-compatibility/2006">
+    <mc:Choice xmlns:p14="http://schemas.microsoft.com/office/powerpoint/2010/main" Requires="p14">
+      <p:transition spd="slow" p14:dur="1750" advTm="3000">
         <p14:ferris dir="l"/>
       </p:transition>
     </mc:Choice>
-    <mc:Fallback xmlns="">
-      <p:transition spd="slow">
+    <mc:Fallback>
+      <p:transition spd="slow" advTm="3000">
         <p:fade/>
       </p:transition>
     </mc:Fallback>
@@ -8422,14 +8422,14 @@
   <p:clrMapOvr>
     <a:masterClrMapping/>
   </p:clrMapOvr>
-  <mc:AlternateContent xmlns:mc="http://schemas.openxmlformats.org/markup-compatibility/2006" xmlns:p14="http://schemas.microsoft.com/office/powerpoint/2010/main">
-    <mc:Choice Requires="p14">
-      <p:transition spd="slow" p14:dur="1750">
+  <mc:AlternateContent xmlns:mc="http://schemas.openxmlformats.org/markup-compatibility/2006">
+    <mc:Choice xmlns:p14="http://schemas.microsoft.com/office/powerpoint/2010/main" Requires="p14">
+      <p:transition spd="slow" p14:dur="1750" advTm="3000">
         <p14:ferris dir="l"/>
       </p:transition>
     </mc:Choice>
-    <mc:Fallback xmlns="">
-      <p:transition spd="slow">
+    <mc:Fallback>
+      <p:transition spd="slow" advTm="3000">
         <p:fade/>
       </p:transition>
     </mc:Fallback>
@@ -9021,14 +9021,14 @@
   <p:clrMapOvr>
     <a:masterClrMapping/>
   </p:clrMapOvr>
-  <mc:AlternateContent xmlns:mc="http://schemas.openxmlformats.org/markup-compatibility/2006" xmlns:p14="http://schemas.microsoft.com/office/powerpoint/2010/main">
-    <mc:Choice Requires="p14">
-      <p:transition spd="slow" p14:dur="1750">
+  <mc:AlternateContent xmlns:mc="http://schemas.openxmlformats.org/markup-compatibility/2006">
+    <mc:Choice xmlns:p14="http://schemas.microsoft.com/office/powerpoint/2010/main" Requires="p14">
+      <p:transition spd="slow" p14:dur="1750" advTm="3000">
         <p14:ferris dir="l"/>
       </p:transition>
     </mc:Choice>
-    <mc:Fallback xmlns="">
-      <p:transition spd="slow">
+    <mc:Fallback>
+      <p:transition spd="slow" advTm="3000">
         <p:fade/>
       </p:transition>
     </mc:Fallback>
@@ -9633,14 +9633,14 @@
     <p:sldLayoutId id="2147483667" r:id="rId11"/>
     <p:sldLayoutId id="2147483668" r:id="rId12"/>
   </p:sldLayoutIdLst>
-  <mc:AlternateContent xmlns:mc="http://schemas.openxmlformats.org/markup-compatibility/2006" xmlns:p14="http://schemas.microsoft.com/office/powerpoint/2010/main">
-    <mc:Choice Requires="p14">
-      <p:transition spd="slow" p14:dur="1750">
+  <mc:AlternateContent xmlns:mc="http://schemas.openxmlformats.org/markup-compatibility/2006">
+    <mc:Choice xmlns:p14="http://schemas.microsoft.com/office/powerpoint/2010/main" Requires="p14">
+      <p:transition spd="slow" p14:dur="1750" advTm="3000">
         <p14:ferris dir="l"/>
       </p:transition>
     </mc:Choice>
-    <mc:Fallback xmlns="">
-      <p:transition spd="slow">
+    <mc:Fallback>
+      <p:transition spd="slow" advTm="3000">
         <p:fade/>
       </p:transition>
     </mc:Fallback>
@@ -11926,14 +11926,14 @@
   <p:clrMapOvr>
     <a:masterClrMapping/>
   </p:clrMapOvr>
-  <mc:AlternateContent xmlns:mc="http://schemas.openxmlformats.org/markup-compatibility/2006" xmlns:p14="http://schemas.microsoft.com/office/powerpoint/2010/main">
-    <mc:Choice Requires="p14">
-      <p:transition spd="slow" p14:dur="1750">
+  <mc:AlternateContent xmlns:mc="http://schemas.openxmlformats.org/markup-compatibility/2006">
+    <mc:Choice xmlns:p14="http://schemas.microsoft.com/office/powerpoint/2010/main" Requires="p14">
+      <p:transition spd="slow" p14:dur="1750" advTm="3000">
         <p14:ferris dir="l"/>
       </p:transition>
     </mc:Choice>
-    <mc:Fallback xmlns="">
-      <p:transition spd="slow">
+    <mc:Fallback>
+      <p:transition spd="slow" advTm="3000">
         <p:fade/>
       </p:transition>
     </mc:Fallback>
@@ -13564,14 +13564,14 @@
   <p:clrMapOvr>
     <a:masterClrMapping/>
   </p:clrMapOvr>
-  <mc:AlternateContent xmlns:mc="http://schemas.openxmlformats.org/markup-compatibility/2006" xmlns:p14="http://schemas.microsoft.com/office/powerpoint/2010/main">
-    <mc:Choice Requires="p14">
-      <p:transition spd="slow" p14:dur="1750">
+  <mc:AlternateContent xmlns:mc="http://schemas.openxmlformats.org/markup-compatibility/2006">
+    <mc:Choice xmlns:p14="http://schemas.microsoft.com/office/powerpoint/2010/main" Requires="p14">
+      <p:transition spd="slow" p14:dur="1750" advTm="3000">
         <p14:ferris dir="l"/>
       </p:transition>
     </mc:Choice>
-    <mc:Fallback xmlns="">
-      <p:transition spd="slow">
+    <mc:Fallback>
+      <p:transition spd="slow" advTm="3000">
         <p:fade/>
       </p:transition>
     </mc:Fallback>
@@ -14548,14 +14548,14 @@
   <p:clrMapOvr>
     <a:masterClrMapping/>
   </p:clrMapOvr>
-  <mc:AlternateContent xmlns:mc="http://schemas.openxmlformats.org/markup-compatibility/2006" xmlns:p14="http://schemas.microsoft.com/office/powerpoint/2010/main">
-    <mc:Choice Requires="p14">
-      <p:transition spd="slow" p14:dur="1750">
+  <mc:AlternateContent xmlns:mc="http://schemas.openxmlformats.org/markup-compatibility/2006">
+    <mc:Choice xmlns:p14="http://schemas.microsoft.com/office/powerpoint/2010/main" Requires="p14">
+      <p:transition spd="slow" p14:dur="1750" advTm="3000">
         <p14:ferris dir="l"/>
       </p:transition>
     </mc:Choice>
-    <mc:Fallback xmlns="">
-      <p:transition spd="slow">
+    <mc:Fallback>
+      <p:transition spd="slow" advTm="3000">
         <p:fade/>
       </p:transition>
     </mc:Fallback>
@@ -26626,14 +26626,14 @@
   <p:clrMapOvr>
     <a:masterClrMapping/>
   </p:clrMapOvr>
-  <mc:AlternateContent xmlns:mc="http://schemas.openxmlformats.org/markup-compatibility/2006" xmlns:p14="http://schemas.microsoft.com/office/powerpoint/2010/main">
-    <mc:Choice Requires="p14">
-      <p:transition spd="slow" p14:dur="1750">
+  <mc:AlternateContent xmlns:mc="http://schemas.openxmlformats.org/markup-compatibility/2006">
+    <mc:Choice xmlns:p14="http://schemas.microsoft.com/office/powerpoint/2010/main" Requires="p14">
+      <p:transition spd="slow" p14:dur="1750" advTm="3000">
         <p14:ferris dir="l"/>
       </p:transition>
     </mc:Choice>
-    <mc:Fallback xmlns="">
-      <p:transition spd="slow">
+    <mc:Fallback>
+      <p:transition spd="slow" advTm="3000">
         <p:fade/>
       </p:transition>
     </mc:Fallback>
@@ -27467,7 +27467,7 @@
           <p:nvPr/>
         </p:nvPicPr>
         <p:blipFill>
-          <a:blip r:embed="rId3">
+          <a:blip r:embed="rId5">
             <a:extLst>
               <a:ext uri="{28A0092B-C50C-407E-A947-70E740481C1C}">
                 <a14:useLocalDpi xmlns:a14="http://schemas.microsoft.com/office/drawing/2010/main" val="0"/>
@@ -27499,23 +27499,148 @@
           </a:extLst>
         </p:spPr>
       </p:pic>
+      <p:pic>
+        <p:nvPicPr>
+          <p:cNvPr id="2" name="glas">
+            <a:hlinkClick r:id="" action="ppaction://media"/>
+            <a:extLst>
+              <a:ext uri="{FF2B5EF4-FFF2-40B4-BE49-F238E27FC236}">
+                <a16:creationId xmlns:a16="http://schemas.microsoft.com/office/drawing/2014/main" id="{85705716-1A28-43AB-9943-44C09613F67D}"/>
+              </a:ext>
+            </a:extLst>
+          </p:cNvPr>
+          <p:cNvPicPr>
+            <a:picLocks noChangeAspect="1"/>
+          </p:cNvPicPr>
+          <p:nvPr>
+            <a:audioFile r:link="rId2"/>
+            <p:extLst>
+              <p:ext uri="{DAA4B4D4-6D71-4841-9C94-3DE7FCFB9230}">
+                <p14:media xmlns:p14="http://schemas.microsoft.com/office/powerpoint/2010/main" r:embed="rId1"/>
+              </p:ext>
+            </p:extLst>
+          </p:nvPr>
+        </p:nvPicPr>
+        <p:blipFill>
+          <a:blip r:embed="rId6"/>
+          <a:stretch>
+            <a:fillRect/>
+          </a:stretch>
+        </p:blipFill>
+        <p:spPr>
+          <a:xfrm>
+            <a:off x="8191927" y="4251960"/>
+            <a:ext cx="609600" cy="609600"/>
+          </a:xfrm>
+          <a:prstGeom prst="rect">
+            <a:avLst/>
+          </a:prstGeom>
+        </p:spPr>
+      </p:pic>
     </p:spTree>
   </p:cSld>
   <p:clrMapOvr>
     <a:masterClrMapping/>
   </p:clrMapOvr>
-  <mc:AlternateContent xmlns:mc="http://schemas.openxmlformats.org/markup-compatibility/2006" xmlns:p14="http://schemas.microsoft.com/office/powerpoint/2010/main">
-    <mc:Choice Requires="p14">
-      <p:transition spd="slow" p14:dur="1750">
+  <mc:AlternateContent xmlns:mc="http://schemas.openxmlformats.org/markup-compatibility/2006">
+    <mc:Choice xmlns:p14="http://schemas.microsoft.com/office/powerpoint/2010/main" Requires="p14">
+      <p:transition spd="slow" p14:dur="1750" advTm="3000">
         <p14:ferris dir="l"/>
       </p:transition>
     </mc:Choice>
-    <mc:Fallback xmlns="">
-      <p:transition spd="slow">
+    <mc:Fallback>
+      <p:transition spd="slow" advTm="3000">
         <p:fade/>
       </p:transition>
     </mc:Fallback>
   </mc:AlternateContent>
+  <p:timing>
+    <p:tnLst>
+      <p:par>
+        <p:cTn id="1" dur="indefinite" restart="never" nodeType="tmRoot">
+          <p:childTnLst>
+            <p:seq concurrent="1" nextAc="seek">
+              <p:cTn id="2" dur="indefinite" nodeType="mainSeq">
+                <p:childTnLst>
+                  <p:par>
+                    <p:cTn id="3" fill="hold">
+                      <p:stCondLst>
+                        <p:cond delay="indefinite"/>
+                        <p:cond evt="onBegin" delay="0">
+                          <p:tn val="2"/>
+                        </p:cond>
+                      </p:stCondLst>
+                      <p:childTnLst>
+                        <p:par>
+                          <p:cTn id="4" fill="hold">
+                            <p:stCondLst>
+                              <p:cond delay="0"/>
+                            </p:stCondLst>
+                            <p:childTnLst>
+                              <p:par>
+                                <p:cTn id="5" presetID="1" presetClass="mediacall" presetSubtype="0" fill="hold" nodeType="afterEffect">
+                                  <p:stCondLst>
+                                    <p:cond delay="0"/>
+                                  </p:stCondLst>
+                                  <p:childTnLst>
+                                    <p:cmd type="call" cmd="playFrom(0.0)">
+                                      <p:cBhvr>
+                                        <p:cTn id="6" dur="29466" fill="hold"/>
+                                        <p:tgtEl>
+                                          <p:spTgt spid="2"/>
+                                        </p:tgtEl>
+                                      </p:cBhvr>
+                                    </p:cmd>
+                                  </p:childTnLst>
+                                </p:cTn>
+                              </p:par>
+                            </p:childTnLst>
+                          </p:cTn>
+                        </p:par>
+                      </p:childTnLst>
+                    </p:cTn>
+                  </p:par>
+                </p:childTnLst>
+              </p:cTn>
+              <p:prevCondLst>
+                <p:cond evt="onPrev" delay="0">
+                  <p:tgtEl>
+                    <p:sldTgt/>
+                  </p:tgtEl>
+                </p:cond>
+              </p:prevCondLst>
+              <p:nextCondLst>
+                <p:cond evt="onNext" delay="0">
+                  <p:tgtEl>
+                    <p:sldTgt/>
+                  </p:tgtEl>
+                </p:cond>
+              </p:nextCondLst>
+            </p:seq>
+            <p:audio>
+              <p:cMediaNode vol="80000" showWhenStopped="0">
+                <p:cTn id="7" fill="hold" display="0">
+                  <p:stCondLst>
+                    <p:cond delay="indefinite"/>
+                  </p:stCondLst>
+                  <p:endCondLst>
+                    <p:cond evt="onStopAudio" delay="0">
+                      <p:tgtEl>
+                        <p:sldTgt/>
+                      </p:tgtEl>
+                    </p:cond>
+                  </p:endCondLst>
+                </p:cTn>
+                <p:tgtEl>
+                  <p:spTgt spid="2"/>
+                </p:tgtEl>
+              </p:cMediaNode>
+            </p:audio>
+          </p:childTnLst>
+        </p:cTn>
+      </p:par>
+    </p:tnLst>
+  </p:timing>
 </p:sld>
 </file>
 
@@ -28567,14 +28692,14 @@
   <p:clrMapOvr>
     <a:masterClrMapping/>
   </p:clrMapOvr>
-  <mc:AlternateContent xmlns:mc="http://schemas.openxmlformats.org/markup-compatibility/2006" xmlns:p14="http://schemas.microsoft.com/office/powerpoint/2010/main">
-    <mc:Choice Requires="p14">
-      <p:transition spd="slow" p14:dur="1750">
+  <mc:AlternateContent xmlns:mc="http://schemas.openxmlformats.org/markup-compatibility/2006">
+    <mc:Choice xmlns:p14="http://schemas.microsoft.com/office/powerpoint/2010/main" Requires="p14">
+      <p:transition spd="slow" p14:dur="1750" advTm="3000">
         <p14:ferris dir="l"/>
       </p:transition>
     </mc:Choice>
-    <mc:Fallback xmlns="">
-      <p:transition spd="slow">
+    <mc:Fallback>
+      <p:transition spd="slow" advTm="3000">
         <p:fade/>
       </p:transition>
     </mc:Fallback>
@@ -29280,14 +29405,14 @@
   <p:clrMapOvr>
     <a:masterClrMapping/>
   </p:clrMapOvr>
-  <mc:AlternateContent xmlns:mc="http://schemas.openxmlformats.org/markup-compatibility/2006" xmlns:p14="http://schemas.microsoft.com/office/powerpoint/2010/main">
-    <mc:Choice Requires="p14">
-      <p:transition spd="slow" p14:dur="1750">
+  <mc:AlternateContent xmlns:mc="http://schemas.openxmlformats.org/markup-compatibility/2006">
+    <mc:Choice xmlns:p14="http://schemas.microsoft.com/office/powerpoint/2010/main" Requires="p14">
+      <p:transition spd="slow" p14:dur="1750" advTm="3000">
         <p14:ferris dir="l"/>
       </p:transition>
     </mc:Choice>
-    <mc:Fallback xmlns="">
-      <p:transition spd="slow">
+    <mc:Fallback>
+      <p:transition spd="slow" advTm="3000">
         <p:fade/>
       </p:transition>
     </mc:Fallback>
@@ -29725,14 +29850,14 @@
   <p:clrMapOvr>
     <a:masterClrMapping/>
   </p:clrMapOvr>
-  <mc:AlternateContent xmlns:mc="http://schemas.openxmlformats.org/markup-compatibility/2006" xmlns:p14="http://schemas.microsoft.com/office/powerpoint/2010/main">
-    <mc:Choice Requires="p14">
-      <p:transition spd="slow" p14:dur="1750">
+  <mc:AlternateContent xmlns:mc="http://schemas.openxmlformats.org/markup-compatibility/2006">
+    <mc:Choice xmlns:p14="http://schemas.microsoft.com/office/powerpoint/2010/main" Requires="p14">
+      <p:transition spd="slow" p14:dur="1750" advTm="3000">
         <p14:ferris dir="l"/>
       </p:transition>
     </mc:Choice>
-    <mc:Fallback xmlns="">
-      <p:transition spd="slow">
+    <mc:Fallback>
+      <p:transition spd="slow" advTm="3000">
         <p:fade/>
       </p:transition>
     </mc:Fallback>

</xml_diff>

<commit_message>
Add Mirena's audio to the presentation
</commit_message>
<xml_diff>
--- a/Documents/Documentation & Presentation/Presentation.pptx
+++ b/Documents/Documentation & Presentation/Presentation.pptx
@@ -14523,7 +14523,7 @@
           <p:nvPr/>
         </p:nvPicPr>
         <p:blipFill>
-          <a:blip r:embed="rId2"/>
+          <a:blip r:embed="rId4"/>
           <a:stretch>
             <a:fillRect/>
           </a:stretch>
@@ -14532,6 +14532,44 @@
           <a:xfrm>
             <a:off x="4330542" y="1745674"/>
             <a:ext cx="4411677" cy="2481568"/>
+          </a:xfrm>
+          <a:prstGeom prst="rect">
+            <a:avLst/>
+          </a:prstGeom>
+        </p:spPr>
+      </p:pic>
+      <p:pic>
+        <p:nvPicPr>
+          <p:cNvPr id="16" name="Glas (1)">
+            <a:hlinkClick r:id="" action="ppaction://media"/>
+            <a:extLst>
+              <a:ext uri="{FF2B5EF4-FFF2-40B4-BE49-F238E27FC236}">
+                <a16:creationId xmlns:a16="http://schemas.microsoft.com/office/drawing/2014/main" id="{A86783B5-3621-40A2-A259-8E0728312D09}"/>
+              </a:ext>
+            </a:extLst>
+          </p:cNvPr>
+          <p:cNvPicPr>
+            <a:picLocks noChangeAspect="1"/>
+          </p:cNvPicPr>
+          <p:nvPr>
+            <a:audioFile r:link="rId2"/>
+            <p:extLst>
+              <p:ext uri="{DAA4B4D4-6D71-4841-9C94-3DE7FCFB9230}">
+                <p14:media xmlns:p14="http://schemas.microsoft.com/office/powerpoint/2010/main" r:embed="rId1"/>
+              </p:ext>
+            </p:extLst>
+          </p:nvPr>
+        </p:nvPicPr>
+        <p:blipFill>
+          <a:blip r:embed="rId5"/>
+          <a:stretch>
+            <a:fillRect/>
+          </a:stretch>
+        </p:blipFill>
+        <p:spPr>
+          <a:xfrm>
+            <a:off x="7955622" y="4434798"/>
+            <a:ext cx="609600" cy="609600"/>
           </a:xfrm>
           <a:prstGeom prst="rect">
             <a:avLst/>
@@ -14560,6 +14598,93 @@
       </p:transition>
     </mc:Fallback>
   </mc:AlternateContent>
+  <p:timing>
+    <p:tnLst>
+      <p:par>
+        <p:cTn id="1" dur="indefinite" restart="never" nodeType="tmRoot">
+          <p:childTnLst>
+            <p:seq concurrent="1" nextAc="seek">
+              <p:cTn id="2" dur="indefinite" nodeType="mainSeq">
+                <p:childTnLst>
+                  <p:par>
+                    <p:cTn id="3" fill="hold">
+                      <p:stCondLst>
+                        <p:cond delay="indefinite"/>
+                        <p:cond evt="onBegin" delay="0">
+                          <p:tn val="2"/>
+                        </p:cond>
+                      </p:stCondLst>
+                      <p:childTnLst>
+                        <p:par>
+                          <p:cTn id="4" fill="hold">
+                            <p:stCondLst>
+                              <p:cond delay="0"/>
+                            </p:stCondLst>
+                            <p:childTnLst>
+                              <p:par>
+                                <p:cTn id="5" presetID="1" presetClass="mediacall" presetSubtype="0" fill="hold" nodeType="afterEffect">
+                                  <p:stCondLst>
+                                    <p:cond delay="0"/>
+                                  </p:stCondLst>
+                                  <p:childTnLst>
+                                    <p:cmd type="call" cmd="playFrom(0.0)">
+                                      <p:cBhvr>
+                                        <p:cTn id="6" dur="16526" fill="hold"/>
+                                        <p:tgtEl>
+                                          <p:spTgt spid="16"/>
+                                        </p:tgtEl>
+                                      </p:cBhvr>
+                                    </p:cmd>
+                                  </p:childTnLst>
+                                </p:cTn>
+                              </p:par>
+                            </p:childTnLst>
+                          </p:cTn>
+                        </p:par>
+                      </p:childTnLst>
+                    </p:cTn>
+                  </p:par>
+                </p:childTnLst>
+              </p:cTn>
+              <p:prevCondLst>
+                <p:cond evt="onPrev" delay="0">
+                  <p:tgtEl>
+                    <p:sldTgt/>
+                  </p:tgtEl>
+                </p:cond>
+              </p:prevCondLst>
+              <p:nextCondLst>
+                <p:cond evt="onNext" delay="0">
+                  <p:tgtEl>
+                    <p:sldTgt/>
+                  </p:tgtEl>
+                </p:cond>
+              </p:nextCondLst>
+            </p:seq>
+            <p:audio>
+              <p:cMediaNode vol="80000" showWhenStopped="0">
+                <p:cTn id="7" fill="hold" display="0">
+                  <p:stCondLst>
+                    <p:cond delay="indefinite"/>
+                  </p:stCondLst>
+                  <p:endCondLst>
+                    <p:cond evt="onStopAudio" delay="0">
+                      <p:tgtEl>
+                        <p:sldTgt/>
+                      </p:tgtEl>
+                    </p:cond>
+                  </p:endCondLst>
+                </p:cTn>
+                <p:tgtEl>
+                  <p:spTgt spid="16"/>
+                </p:tgtEl>
+              </p:cMediaNode>
+            </p:audio>
+          </p:childTnLst>
+        </p:cTn>
+      </p:par>
+    </p:tnLst>
+  </p:timing>
 </p:sld>
 </file>
 

</xml_diff>

<commit_message>
Add Alexander's voice to the presentation
</commit_message>
<xml_diff>
--- a/Documents/Documentation & Presentation/Presentation.pptx
+++ b/Documents/Documentation & Presentation/Presentation.pptx
@@ -45,14 +45,14 @@
       <p:bold r:id="rId22"/>
     </p:embeddedFont>
     <p:embeddedFont>
-      <p:font typeface="Titillium Web" panose="020B0604020202020204" charset="0"/>
+      <p:font typeface="Titillium Web" panose="00000500000000000000" pitchFamily="2" charset="0"/>
       <p:regular r:id="rId23"/>
       <p:bold r:id="rId24"/>
       <p:italic r:id="rId25"/>
       <p:boldItalic r:id="rId26"/>
     </p:embeddedFont>
     <p:embeddedFont>
-      <p:font typeface="Titillium Web SemiBold" panose="020B0604020202020204" charset="0"/>
+      <p:font typeface="Titillium Web SemiBold" panose="00000700000000000000" pitchFamily="2" charset="0"/>
       <p:regular r:id="rId27"/>
       <p:bold r:id="rId28"/>
       <p:italic r:id="rId29"/>
@@ -2218,13 +2218,13 @@
   <p:clrMapOvr>
     <a:masterClrMapping/>
   </p:clrMapOvr>
-  <mc:AlternateContent xmlns:mc="http://schemas.openxmlformats.org/markup-compatibility/2006">
-    <mc:Choice xmlns:p14="http://schemas.microsoft.com/office/powerpoint/2010/main" Requires="p14">
+  <mc:AlternateContent xmlns:mc="http://schemas.openxmlformats.org/markup-compatibility/2006" xmlns:p14="http://schemas.microsoft.com/office/powerpoint/2010/main">
+    <mc:Choice Requires="p14">
       <p:transition spd="slow" p14:dur="1750" advTm="3000">
         <p14:ferris dir="l"/>
       </p:transition>
     </mc:Choice>
-    <mc:Fallback>
+    <mc:Fallback xmlns="">
       <p:transition spd="slow" advTm="3000">
         <p:fade/>
       </p:transition>
@@ -3462,13 +3462,13 @@
   <p:clrMapOvr>
     <a:masterClrMapping/>
   </p:clrMapOvr>
-  <mc:AlternateContent xmlns:mc="http://schemas.openxmlformats.org/markup-compatibility/2006">
-    <mc:Choice xmlns:p14="http://schemas.microsoft.com/office/powerpoint/2010/main" Requires="p14">
+  <mc:AlternateContent xmlns:mc="http://schemas.openxmlformats.org/markup-compatibility/2006" xmlns:p14="http://schemas.microsoft.com/office/powerpoint/2010/main">
+    <mc:Choice Requires="p14">
       <p:transition spd="slow" p14:dur="1750" advTm="3000">
         <p14:ferris dir="l"/>
       </p:transition>
     </mc:Choice>
-    <mc:Fallback>
+    <mc:Fallback xmlns="">
       <p:transition spd="slow" advTm="3000">
         <p:fade/>
       </p:transition>
@@ -3932,13 +3932,13 @@
   <p:clrMapOvr>
     <a:masterClrMapping/>
   </p:clrMapOvr>
-  <mc:AlternateContent xmlns:mc="http://schemas.openxmlformats.org/markup-compatibility/2006">
-    <mc:Choice xmlns:p14="http://schemas.microsoft.com/office/powerpoint/2010/main" Requires="p14">
+  <mc:AlternateContent xmlns:mc="http://schemas.openxmlformats.org/markup-compatibility/2006" xmlns:p14="http://schemas.microsoft.com/office/powerpoint/2010/main">
+    <mc:Choice Requires="p14">
       <p:transition spd="slow" p14:dur="1750" advTm="3000">
         <p14:ferris dir="l"/>
       </p:transition>
     </mc:Choice>
-    <mc:Fallback>
+    <mc:Fallback xmlns="">
       <p:transition spd="slow" advTm="3000">
         <p:fade/>
       </p:transition>
@@ -5821,13 +5821,13 @@
   <p:clrMapOvr>
     <a:masterClrMapping/>
   </p:clrMapOvr>
-  <mc:AlternateContent xmlns:mc="http://schemas.openxmlformats.org/markup-compatibility/2006">
-    <mc:Choice xmlns:p14="http://schemas.microsoft.com/office/powerpoint/2010/main" Requires="p14">
+  <mc:AlternateContent xmlns:mc="http://schemas.openxmlformats.org/markup-compatibility/2006" xmlns:p14="http://schemas.microsoft.com/office/powerpoint/2010/main">
+    <mc:Choice Requires="p14">
       <p:transition spd="slow" p14:dur="1750" advTm="3000">
         <p14:ferris dir="l"/>
       </p:transition>
     </mc:Choice>
-    <mc:Fallback>
+    <mc:Fallback xmlns="">
       <p:transition spd="slow" advTm="3000">
         <p:fade/>
       </p:transition>
@@ -6549,13 +6549,13 @@
   <p:clrMapOvr>
     <a:masterClrMapping/>
   </p:clrMapOvr>
-  <mc:AlternateContent xmlns:mc="http://schemas.openxmlformats.org/markup-compatibility/2006">
-    <mc:Choice xmlns:p14="http://schemas.microsoft.com/office/powerpoint/2010/main" Requires="p14">
+  <mc:AlternateContent xmlns:mc="http://schemas.openxmlformats.org/markup-compatibility/2006" xmlns:p14="http://schemas.microsoft.com/office/powerpoint/2010/main">
+    <mc:Choice Requires="p14">
       <p:transition spd="slow" p14:dur="1750" advTm="3000">
         <p14:ferris dir="l"/>
       </p:transition>
     </mc:Choice>
-    <mc:Fallback>
+    <mc:Fallback xmlns="">
       <p:transition spd="slow" advTm="3000">
         <p:fade/>
       </p:transition>
@@ -7019,13 +7019,13 @@
   <p:clrMapOvr>
     <a:masterClrMapping/>
   </p:clrMapOvr>
-  <mc:AlternateContent xmlns:mc="http://schemas.openxmlformats.org/markup-compatibility/2006">
-    <mc:Choice xmlns:p14="http://schemas.microsoft.com/office/powerpoint/2010/main" Requires="p14">
+  <mc:AlternateContent xmlns:mc="http://schemas.openxmlformats.org/markup-compatibility/2006" xmlns:p14="http://schemas.microsoft.com/office/powerpoint/2010/main">
+    <mc:Choice Requires="p14">
       <p:transition spd="slow" p14:dur="1750" advTm="3000">
         <p14:ferris dir="l"/>
       </p:transition>
     </mc:Choice>
-    <mc:Fallback>
+    <mc:Fallback xmlns="">
       <p:transition spd="slow" advTm="3000">
         <p:fade/>
       </p:transition>
@@ -7185,13 +7185,13 @@
   <p:clrMapOvr>
     <a:masterClrMapping/>
   </p:clrMapOvr>
-  <mc:AlternateContent xmlns:mc="http://schemas.openxmlformats.org/markup-compatibility/2006">
-    <mc:Choice xmlns:p14="http://schemas.microsoft.com/office/powerpoint/2010/main" Requires="p14">
+  <mc:AlternateContent xmlns:mc="http://schemas.openxmlformats.org/markup-compatibility/2006" xmlns:p14="http://schemas.microsoft.com/office/powerpoint/2010/main">
+    <mc:Choice Requires="p14">
       <p:transition spd="slow" p14:dur="1750" advTm="3000">
         <p14:ferris dir="l"/>
       </p:transition>
     </mc:Choice>
-    <mc:Fallback>
+    <mc:Fallback xmlns="">
       <p:transition spd="slow" advTm="3000">
         <p:fade/>
       </p:transition>
@@ -7636,13 +7636,13 @@
   <p:clrMapOvr>
     <a:masterClrMapping/>
   </p:clrMapOvr>
-  <mc:AlternateContent xmlns:mc="http://schemas.openxmlformats.org/markup-compatibility/2006">
-    <mc:Choice xmlns:p14="http://schemas.microsoft.com/office/powerpoint/2010/main" Requires="p14">
+  <mc:AlternateContent xmlns:mc="http://schemas.openxmlformats.org/markup-compatibility/2006" xmlns:p14="http://schemas.microsoft.com/office/powerpoint/2010/main">
+    <mc:Choice Requires="p14">
       <p:transition spd="slow" p14:dur="1750" advTm="3000">
         <p14:ferris dir="l"/>
       </p:transition>
     </mc:Choice>
-    <mc:Fallback>
+    <mc:Fallback xmlns="">
       <p:transition spd="slow" advTm="3000">
         <p:fade/>
       </p:transition>
@@ -7717,13 +7717,13 @@
   <p:clrMapOvr>
     <a:masterClrMapping/>
   </p:clrMapOvr>
-  <mc:AlternateContent xmlns:mc="http://schemas.openxmlformats.org/markup-compatibility/2006">
-    <mc:Choice xmlns:p14="http://schemas.microsoft.com/office/powerpoint/2010/main" Requires="p14">
+  <mc:AlternateContent xmlns:mc="http://schemas.openxmlformats.org/markup-compatibility/2006" xmlns:p14="http://schemas.microsoft.com/office/powerpoint/2010/main">
+    <mc:Choice Requires="p14">
       <p:transition spd="slow" p14:dur="1750" advTm="3000">
         <p14:ferris dir="l"/>
       </p:transition>
     </mc:Choice>
-    <mc:Fallback>
+    <mc:Fallback xmlns="">
       <p:transition spd="slow" advTm="3000">
         <p:fade/>
       </p:transition>
@@ -7754,13 +7754,13 @@
   <p:clrMapOvr>
     <a:masterClrMapping/>
   </p:clrMapOvr>
-  <mc:AlternateContent xmlns:mc="http://schemas.openxmlformats.org/markup-compatibility/2006">
-    <mc:Choice xmlns:p14="http://schemas.microsoft.com/office/powerpoint/2010/main" Requires="p14">
+  <mc:AlternateContent xmlns:mc="http://schemas.openxmlformats.org/markup-compatibility/2006" xmlns:p14="http://schemas.microsoft.com/office/powerpoint/2010/main">
+    <mc:Choice Requires="p14">
       <p:transition spd="slow" p14:dur="1750" advTm="3000">
         <p14:ferris dir="l"/>
       </p:transition>
     </mc:Choice>
-    <mc:Fallback>
+    <mc:Fallback xmlns="">
       <p:transition spd="slow" advTm="3000">
         <p:fade/>
       </p:transition>
@@ -8422,13 +8422,13 @@
   <p:clrMapOvr>
     <a:masterClrMapping/>
   </p:clrMapOvr>
-  <mc:AlternateContent xmlns:mc="http://schemas.openxmlformats.org/markup-compatibility/2006">
-    <mc:Choice xmlns:p14="http://schemas.microsoft.com/office/powerpoint/2010/main" Requires="p14">
+  <mc:AlternateContent xmlns:mc="http://schemas.openxmlformats.org/markup-compatibility/2006" xmlns:p14="http://schemas.microsoft.com/office/powerpoint/2010/main">
+    <mc:Choice Requires="p14">
       <p:transition spd="slow" p14:dur="1750" advTm="3000">
         <p14:ferris dir="l"/>
       </p:transition>
     </mc:Choice>
-    <mc:Fallback>
+    <mc:Fallback xmlns="">
       <p:transition spd="slow" advTm="3000">
         <p:fade/>
       </p:transition>
@@ -9021,13 +9021,13 @@
   <p:clrMapOvr>
     <a:masterClrMapping/>
   </p:clrMapOvr>
-  <mc:AlternateContent xmlns:mc="http://schemas.openxmlformats.org/markup-compatibility/2006">
-    <mc:Choice xmlns:p14="http://schemas.microsoft.com/office/powerpoint/2010/main" Requires="p14">
+  <mc:AlternateContent xmlns:mc="http://schemas.openxmlformats.org/markup-compatibility/2006" xmlns:p14="http://schemas.microsoft.com/office/powerpoint/2010/main">
+    <mc:Choice Requires="p14">
       <p:transition spd="slow" p14:dur="1750" advTm="3000">
         <p14:ferris dir="l"/>
       </p:transition>
     </mc:Choice>
-    <mc:Fallback>
+    <mc:Fallback xmlns="">
       <p:transition spd="slow" advTm="3000">
         <p:fade/>
       </p:transition>
@@ -9633,13 +9633,13 @@
     <p:sldLayoutId id="2147483667" r:id="rId11"/>
     <p:sldLayoutId id="2147483668" r:id="rId12"/>
   </p:sldLayoutIdLst>
-  <mc:AlternateContent xmlns:mc="http://schemas.openxmlformats.org/markup-compatibility/2006">
-    <mc:Choice xmlns:p14="http://schemas.microsoft.com/office/powerpoint/2010/main" Requires="p14">
+  <mc:AlternateContent xmlns:mc="http://schemas.openxmlformats.org/markup-compatibility/2006" xmlns:p14="http://schemas.microsoft.com/office/powerpoint/2010/main">
+    <mc:Choice Requires="p14">
       <p:transition spd="slow" p14:dur="1750" advTm="3000">
         <p14:ferris dir="l"/>
       </p:transition>
     </mc:Choice>
-    <mc:Fallback>
+    <mc:Fallback xmlns="">
       <p:transition spd="slow" advTm="3000">
         <p:fade/>
       </p:transition>
@@ -11921,23 +11921,148 @@
           </p:txBody>
         </p:sp>
       </p:grpSp>
+      <p:pic>
+        <p:nvPicPr>
+          <p:cNvPr id="2" name="Записан звук">
+            <a:hlinkClick r:id="" action="ppaction://media"/>
+            <a:extLst>
+              <a:ext uri="{FF2B5EF4-FFF2-40B4-BE49-F238E27FC236}">
+                <a16:creationId xmlns:a16="http://schemas.microsoft.com/office/drawing/2014/main" id="{570E6708-ACFF-44C2-A4D1-3A580B40FC98}"/>
+              </a:ext>
+            </a:extLst>
+          </p:cNvPr>
+          <p:cNvPicPr>
+            <a:picLocks noChangeAspect="1"/>
+          </p:cNvPicPr>
+          <p:nvPr>
+            <a:audioFile r:link="rId2"/>
+            <p:extLst>
+              <p:ext uri="{DAA4B4D4-6D71-4841-9C94-3DE7FCFB9230}">
+                <p14:media xmlns:p14="http://schemas.microsoft.com/office/powerpoint/2010/main" r:embed="rId1"/>
+              </p:ext>
+            </p:extLst>
+          </p:nvPr>
+        </p:nvPicPr>
+        <p:blipFill>
+          <a:blip r:embed="rId5"/>
+          <a:stretch>
+            <a:fillRect/>
+          </a:stretch>
+        </p:blipFill>
+        <p:spPr>
+          <a:xfrm>
+            <a:off x="8656637" y="4656137"/>
+            <a:ext cx="487363" cy="487363"/>
+          </a:xfrm>
+          <a:prstGeom prst="rect">
+            <a:avLst/>
+          </a:prstGeom>
+        </p:spPr>
+      </p:pic>
     </p:spTree>
   </p:cSld>
   <p:clrMapOvr>
     <a:masterClrMapping/>
   </p:clrMapOvr>
-  <mc:AlternateContent xmlns:mc="http://schemas.openxmlformats.org/markup-compatibility/2006">
-    <mc:Choice xmlns:p14="http://schemas.microsoft.com/office/powerpoint/2010/main" Requires="p14">
+  <mc:AlternateContent xmlns:mc="http://schemas.openxmlformats.org/markup-compatibility/2006" xmlns:p14="http://schemas.microsoft.com/office/powerpoint/2010/main">
+    <mc:Choice Requires="p14">
       <p:transition spd="slow" p14:dur="1750" advTm="3000">
         <p14:ferris dir="l"/>
       </p:transition>
     </mc:Choice>
-    <mc:Fallback>
+    <mc:Fallback xmlns="">
       <p:transition spd="slow" advTm="3000">
         <p:fade/>
       </p:transition>
     </mc:Fallback>
   </mc:AlternateContent>
+  <p:timing>
+    <p:tnLst>
+      <p:par>
+        <p:cTn id="1" dur="indefinite" restart="never" nodeType="tmRoot">
+          <p:childTnLst>
+            <p:seq concurrent="1" nextAc="seek">
+              <p:cTn id="2" dur="indefinite" nodeType="mainSeq">
+                <p:childTnLst>
+                  <p:par>
+                    <p:cTn id="3" fill="hold">
+                      <p:stCondLst>
+                        <p:cond delay="indefinite"/>
+                        <p:cond evt="onBegin" delay="0">
+                          <p:tn val="2"/>
+                        </p:cond>
+                      </p:stCondLst>
+                      <p:childTnLst>
+                        <p:par>
+                          <p:cTn id="4" fill="hold">
+                            <p:stCondLst>
+                              <p:cond delay="0"/>
+                            </p:stCondLst>
+                            <p:childTnLst>
+                              <p:par>
+                                <p:cTn id="5" presetID="1" presetClass="mediacall" presetSubtype="0" fill="hold" nodeType="afterEffect">
+                                  <p:stCondLst>
+                                    <p:cond delay="0"/>
+                                  </p:stCondLst>
+                                  <p:childTnLst>
+                                    <p:cmd type="call" cmd="playFrom(0.0)">
+                                      <p:cBhvr>
+                                        <p:cTn id="6" dur="6130" fill="hold"/>
+                                        <p:tgtEl>
+                                          <p:spTgt spid="2"/>
+                                        </p:tgtEl>
+                                      </p:cBhvr>
+                                    </p:cmd>
+                                  </p:childTnLst>
+                                </p:cTn>
+                              </p:par>
+                            </p:childTnLst>
+                          </p:cTn>
+                        </p:par>
+                      </p:childTnLst>
+                    </p:cTn>
+                  </p:par>
+                </p:childTnLst>
+              </p:cTn>
+              <p:prevCondLst>
+                <p:cond evt="onPrev" delay="0">
+                  <p:tgtEl>
+                    <p:sldTgt/>
+                  </p:tgtEl>
+                </p:cond>
+              </p:prevCondLst>
+              <p:nextCondLst>
+                <p:cond evt="onNext" delay="0">
+                  <p:tgtEl>
+                    <p:sldTgt/>
+                  </p:tgtEl>
+                </p:cond>
+              </p:nextCondLst>
+            </p:seq>
+            <p:audio>
+              <p:cMediaNode vol="80000" showWhenStopped="0">
+                <p:cTn id="7" fill="hold" display="0">
+                  <p:stCondLst>
+                    <p:cond delay="indefinite"/>
+                  </p:stCondLst>
+                  <p:endCondLst>
+                    <p:cond evt="onStopAudio" delay="0">
+                      <p:tgtEl>
+                        <p:sldTgt/>
+                      </p:tgtEl>
+                    </p:cond>
+                  </p:endCondLst>
+                </p:cTn>
+                <p:tgtEl>
+                  <p:spTgt spid="2"/>
+                </p:tgtEl>
+              </p:cMediaNode>
+            </p:audio>
+          </p:childTnLst>
+        </p:cTn>
+      </p:par>
+    </p:tnLst>
+  </p:timing>
 </p:sld>
 </file>
 
@@ -13184,7 +13309,7 @@
           <p:nvPr/>
         </p:nvPicPr>
         <p:blipFill>
-          <a:blip r:embed="rId3">
+          <a:blip r:embed="rId5">
             <a:clrChange>
               <a:clrFrom>
                 <a:srgbClr val="00B181"/>
@@ -13225,7 +13350,7 @@
           <p:nvPr/>
         </p:nvPicPr>
         <p:blipFill>
-          <a:blip r:embed="rId4">
+          <a:blip r:embed="rId6">
             <a:clrChange>
               <a:clrFrom>
                 <a:srgbClr val="00B181"/>
@@ -13266,7 +13391,7 @@
           <p:nvPr/>
         </p:nvPicPr>
         <p:blipFill>
-          <a:blip r:embed="rId5">
+          <a:blip r:embed="rId7">
             <a:clrChange>
               <a:clrFrom>
                 <a:srgbClr val="00B181"/>
@@ -13307,7 +13432,7 @@
           <p:nvPr/>
         </p:nvPicPr>
         <p:blipFill>
-          <a:blip r:embed="rId6">
+          <a:blip r:embed="rId8">
             <a:clrChange>
               <a:clrFrom>
                 <a:srgbClr val="00B181"/>
@@ -13348,7 +13473,7 @@
           <p:nvPr/>
         </p:nvPicPr>
         <p:blipFill>
-          <a:blip r:embed="rId7">
+          <a:blip r:embed="rId9">
             <a:clrChange>
               <a:clrFrom>
                 <a:srgbClr val="00B181"/>
@@ -13559,23 +13684,148 @@
           </a:ln>
         </p:spPr>
       </p:cxnSp>
+      <p:pic>
+        <p:nvPicPr>
+          <p:cNvPr id="2" name="Записан звук">
+            <a:hlinkClick r:id="" action="ppaction://media"/>
+            <a:extLst>
+              <a:ext uri="{FF2B5EF4-FFF2-40B4-BE49-F238E27FC236}">
+                <a16:creationId xmlns:a16="http://schemas.microsoft.com/office/drawing/2014/main" id="{6174ABE5-3742-49D4-8801-C56B0115E467}"/>
+              </a:ext>
+            </a:extLst>
+          </p:cNvPr>
+          <p:cNvPicPr>
+            <a:picLocks noChangeAspect="1"/>
+          </p:cNvPicPr>
+          <p:nvPr>
+            <a:audioFile r:link="rId2"/>
+            <p:extLst>
+              <p:ext uri="{DAA4B4D4-6D71-4841-9C94-3DE7FCFB9230}">
+                <p14:media xmlns:p14="http://schemas.microsoft.com/office/powerpoint/2010/main" r:embed="rId1"/>
+              </p:ext>
+            </p:extLst>
+          </p:nvPr>
+        </p:nvPicPr>
+        <p:blipFill>
+          <a:blip r:embed="rId10"/>
+          <a:stretch>
+            <a:fillRect/>
+          </a:stretch>
+        </p:blipFill>
+        <p:spPr>
+          <a:xfrm>
+            <a:off x="8635855" y="4637456"/>
+            <a:ext cx="487363" cy="487363"/>
+          </a:xfrm>
+          <a:prstGeom prst="rect">
+            <a:avLst/>
+          </a:prstGeom>
+        </p:spPr>
+      </p:pic>
     </p:spTree>
   </p:cSld>
   <p:clrMapOvr>
     <a:masterClrMapping/>
   </p:clrMapOvr>
-  <mc:AlternateContent xmlns:mc="http://schemas.openxmlformats.org/markup-compatibility/2006">
-    <mc:Choice xmlns:p14="http://schemas.microsoft.com/office/powerpoint/2010/main" Requires="p14">
+  <mc:AlternateContent xmlns:mc="http://schemas.openxmlformats.org/markup-compatibility/2006" xmlns:p14="http://schemas.microsoft.com/office/powerpoint/2010/main">
+    <mc:Choice Requires="p14">
       <p:transition spd="slow" p14:dur="1750" advTm="3000">
         <p14:ferris dir="l"/>
       </p:transition>
     </mc:Choice>
-    <mc:Fallback>
+    <mc:Fallback xmlns="">
       <p:transition spd="slow" advTm="3000">
         <p:fade/>
       </p:transition>
     </mc:Fallback>
   </mc:AlternateContent>
+  <p:timing>
+    <p:tnLst>
+      <p:par>
+        <p:cTn id="1" dur="indefinite" restart="never" nodeType="tmRoot">
+          <p:childTnLst>
+            <p:seq concurrent="1" nextAc="seek">
+              <p:cTn id="2" dur="indefinite" nodeType="mainSeq">
+                <p:childTnLst>
+                  <p:par>
+                    <p:cTn id="3" fill="hold">
+                      <p:stCondLst>
+                        <p:cond delay="indefinite"/>
+                        <p:cond evt="onBegin" delay="0">
+                          <p:tn val="2"/>
+                        </p:cond>
+                      </p:stCondLst>
+                      <p:childTnLst>
+                        <p:par>
+                          <p:cTn id="4" fill="hold">
+                            <p:stCondLst>
+                              <p:cond delay="0"/>
+                            </p:stCondLst>
+                            <p:childTnLst>
+                              <p:par>
+                                <p:cTn id="5" presetID="1" presetClass="mediacall" presetSubtype="0" fill="hold" nodeType="afterEffect">
+                                  <p:stCondLst>
+                                    <p:cond delay="0"/>
+                                  </p:stCondLst>
+                                  <p:childTnLst>
+                                    <p:cmd type="call" cmd="playFrom(0.0)">
+                                      <p:cBhvr>
+                                        <p:cTn id="6" dur="14870" fill="hold"/>
+                                        <p:tgtEl>
+                                          <p:spTgt spid="2"/>
+                                        </p:tgtEl>
+                                      </p:cBhvr>
+                                    </p:cmd>
+                                  </p:childTnLst>
+                                </p:cTn>
+                              </p:par>
+                            </p:childTnLst>
+                          </p:cTn>
+                        </p:par>
+                      </p:childTnLst>
+                    </p:cTn>
+                  </p:par>
+                </p:childTnLst>
+              </p:cTn>
+              <p:prevCondLst>
+                <p:cond evt="onPrev" delay="0">
+                  <p:tgtEl>
+                    <p:sldTgt/>
+                  </p:tgtEl>
+                </p:cond>
+              </p:prevCondLst>
+              <p:nextCondLst>
+                <p:cond evt="onNext" delay="0">
+                  <p:tgtEl>
+                    <p:sldTgt/>
+                  </p:tgtEl>
+                </p:cond>
+              </p:nextCondLst>
+            </p:seq>
+            <p:audio>
+              <p:cMediaNode vol="80000" showWhenStopped="0">
+                <p:cTn id="7" fill="hold" display="0">
+                  <p:stCondLst>
+                    <p:cond delay="indefinite"/>
+                  </p:stCondLst>
+                  <p:endCondLst>
+                    <p:cond evt="onStopAudio" delay="0">
+                      <p:tgtEl>
+                        <p:sldTgt/>
+                      </p:tgtEl>
+                    </p:cond>
+                  </p:endCondLst>
+                </p:cTn>
+                <p:tgtEl>
+                  <p:spTgt spid="2"/>
+                </p:tgtEl>
+              </p:cMediaNode>
+            </p:audio>
+          </p:childTnLst>
+        </p:cTn>
+      </p:par>
+    </p:tnLst>
+  </p:timing>
 </p:sld>
 </file>
 
@@ -14586,13 +14836,13 @@
   <p:clrMapOvr>
     <a:masterClrMapping/>
   </p:clrMapOvr>
-  <mc:AlternateContent xmlns:mc="http://schemas.openxmlformats.org/markup-compatibility/2006">
-    <mc:Choice xmlns:p14="http://schemas.microsoft.com/office/powerpoint/2010/main" Requires="p14">
+  <mc:AlternateContent xmlns:mc="http://schemas.openxmlformats.org/markup-compatibility/2006" xmlns:p14="http://schemas.microsoft.com/office/powerpoint/2010/main">
+    <mc:Choice Requires="p14">
       <p:transition spd="slow" p14:dur="1750" advTm="3000">
         <p14:ferris dir="l"/>
       </p:transition>
     </mc:Choice>
-    <mc:Fallback>
+    <mc:Fallback xmlns="">
       <p:transition spd="slow" advTm="3000">
         <p:fade/>
       </p:transition>
@@ -26751,13 +27001,13 @@
   <p:clrMapOvr>
     <a:masterClrMapping/>
   </p:clrMapOvr>
-  <mc:AlternateContent xmlns:mc="http://schemas.openxmlformats.org/markup-compatibility/2006">
-    <mc:Choice xmlns:p14="http://schemas.microsoft.com/office/powerpoint/2010/main" Requires="p14">
+  <mc:AlternateContent xmlns:mc="http://schemas.openxmlformats.org/markup-compatibility/2006" xmlns:p14="http://schemas.microsoft.com/office/powerpoint/2010/main">
+    <mc:Choice Requires="p14">
       <p:transition spd="slow" p14:dur="1750" advTm="3000">
         <p14:ferris dir="l"/>
       </p:transition>
     </mc:Choice>
-    <mc:Fallback>
+    <mc:Fallback xmlns="">
       <p:transition spd="slow" advTm="3000">
         <p:fade/>
       </p:transition>
@@ -27667,13 +27917,13 @@
   <p:clrMapOvr>
     <a:masterClrMapping/>
   </p:clrMapOvr>
-  <mc:AlternateContent xmlns:mc="http://schemas.openxmlformats.org/markup-compatibility/2006">
-    <mc:Choice xmlns:p14="http://schemas.microsoft.com/office/powerpoint/2010/main" Requires="p14">
+  <mc:AlternateContent xmlns:mc="http://schemas.openxmlformats.org/markup-compatibility/2006" xmlns:p14="http://schemas.microsoft.com/office/powerpoint/2010/main">
+    <mc:Choice Requires="p14">
       <p:transition spd="slow" p14:dur="1750" advTm="3000">
         <p14:ferris dir="l"/>
       </p:transition>
     </mc:Choice>
-    <mc:Fallback>
+    <mc:Fallback xmlns="">
       <p:transition spd="slow" advTm="3000">
         <p:fade/>
       </p:transition>
@@ -28817,13 +29067,13 @@
   <p:clrMapOvr>
     <a:masterClrMapping/>
   </p:clrMapOvr>
-  <mc:AlternateContent xmlns:mc="http://schemas.openxmlformats.org/markup-compatibility/2006">
-    <mc:Choice xmlns:p14="http://schemas.microsoft.com/office/powerpoint/2010/main" Requires="p14">
+  <mc:AlternateContent xmlns:mc="http://schemas.openxmlformats.org/markup-compatibility/2006" xmlns:p14="http://schemas.microsoft.com/office/powerpoint/2010/main">
+    <mc:Choice Requires="p14">
       <p:transition spd="slow" p14:dur="1750" advTm="3000">
         <p14:ferris dir="l"/>
       </p:transition>
     </mc:Choice>
-    <mc:Fallback>
+    <mc:Fallback xmlns="">
       <p:transition spd="slow" advTm="3000">
         <p:fade/>
       </p:transition>
@@ -29530,13 +29780,13 @@
   <p:clrMapOvr>
     <a:masterClrMapping/>
   </p:clrMapOvr>
-  <mc:AlternateContent xmlns:mc="http://schemas.openxmlformats.org/markup-compatibility/2006">
-    <mc:Choice xmlns:p14="http://schemas.microsoft.com/office/powerpoint/2010/main" Requires="p14">
+  <mc:AlternateContent xmlns:mc="http://schemas.openxmlformats.org/markup-compatibility/2006" xmlns:p14="http://schemas.microsoft.com/office/powerpoint/2010/main">
+    <mc:Choice Requires="p14">
       <p:transition spd="slow" p14:dur="1750" advTm="3000">
         <p14:ferris dir="l"/>
       </p:transition>
     </mc:Choice>
-    <mc:Fallback>
+    <mc:Fallback xmlns="">
       <p:transition spd="slow" advTm="3000">
         <p:fade/>
       </p:transition>
@@ -29975,13 +30225,13 @@
   <p:clrMapOvr>
     <a:masterClrMapping/>
   </p:clrMapOvr>
-  <mc:AlternateContent xmlns:mc="http://schemas.openxmlformats.org/markup-compatibility/2006">
-    <mc:Choice xmlns:p14="http://schemas.microsoft.com/office/powerpoint/2010/main" Requires="p14">
+  <mc:AlternateContent xmlns:mc="http://schemas.openxmlformats.org/markup-compatibility/2006" xmlns:p14="http://schemas.microsoft.com/office/powerpoint/2010/main">
+    <mc:Choice Requires="p14">
       <p:transition spd="slow" p14:dur="1750" advTm="3000">
         <p14:ferris dir="l"/>
       </p:transition>
     </mc:Choice>
-    <mc:Fallback>
+    <mc:Fallback xmlns="">
       <p:transition spd="slow" advTm="3000">
         <p:fade/>
       </p:transition>

</xml_diff>